<commit_message>
fixed backwards evidence arrows on graph diagram
</commit_message>
<xml_diff>
--- a/img/dsw-0-4-graph-model.pptx
+++ b/img/dsw-0-4-graph-model.pptx
@@ -304,7 +304,7 @@
           <a:p>
             <a:fld id="{CC04084B-2F15-419C-AA91-DBD329B3D928}" type="datetimeFigureOut">
               <a:rPr lang="en-US" smtClean="0"/>
-              <a:t>7/22/2015</a:t>
+              <a:t>7/23/2015</a:t>
             </a:fld>
             <a:endParaRPr lang="en-US"/>
           </a:p>
@@ -474,7 +474,7 @@
           <a:p>
             <a:fld id="{CC04084B-2F15-419C-AA91-DBD329B3D928}" type="datetimeFigureOut">
               <a:rPr lang="en-US" smtClean="0"/>
-              <a:t>7/22/2015</a:t>
+              <a:t>7/23/2015</a:t>
             </a:fld>
             <a:endParaRPr lang="en-US"/>
           </a:p>
@@ -654,7 +654,7 @@
           <a:p>
             <a:fld id="{CC04084B-2F15-419C-AA91-DBD329B3D928}" type="datetimeFigureOut">
               <a:rPr lang="en-US" smtClean="0"/>
-              <a:t>7/22/2015</a:t>
+              <a:t>7/23/2015</a:t>
             </a:fld>
             <a:endParaRPr lang="en-US"/>
           </a:p>
@@ -824,7 +824,7 @@
           <a:p>
             <a:fld id="{CC04084B-2F15-419C-AA91-DBD329B3D928}" type="datetimeFigureOut">
               <a:rPr lang="en-US" smtClean="0"/>
-              <a:t>7/22/2015</a:t>
+              <a:t>7/23/2015</a:t>
             </a:fld>
             <a:endParaRPr lang="en-US"/>
           </a:p>
@@ -1070,7 +1070,7 @@
           <a:p>
             <a:fld id="{CC04084B-2F15-419C-AA91-DBD329B3D928}" type="datetimeFigureOut">
               <a:rPr lang="en-US" smtClean="0"/>
-              <a:t>7/22/2015</a:t>
+              <a:t>7/23/2015</a:t>
             </a:fld>
             <a:endParaRPr lang="en-US"/>
           </a:p>
@@ -1358,7 +1358,7 @@
           <a:p>
             <a:fld id="{CC04084B-2F15-419C-AA91-DBD329B3D928}" type="datetimeFigureOut">
               <a:rPr lang="en-US" smtClean="0"/>
-              <a:t>7/22/2015</a:t>
+              <a:t>7/23/2015</a:t>
             </a:fld>
             <a:endParaRPr lang="en-US"/>
           </a:p>
@@ -1785,7 +1785,7 @@
           <a:p>
             <a:fld id="{CC04084B-2F15-419C-AA91-DBD329B3D928}" type="datetimeFigureOut">
               <a:rPr lang="en-US" smtClean="0"/>
-              <a:t>7/22/2015</a:t>
+              <a:t>7/23/2015</a:t>
             </a:fld>
             <a:endParaRPr lang="en-US"/>
           </a:p>
@@ -1903,7 +1903,7 @@
           <a:p>
             <a:fld id="{CC04084B-2F15-419C-AA91-DBD329B3D928}" type="datetimeFigureOut">
               <a:rPr lang="en-US" smtClean="0"/>
-              <a:t>7/22/2015</a:t>
+              <a:t>7/23/2015</a:t>
             </a:fld>
             <a:endParaRPr lang="en-US"/>
           </a:p>
@@ -1998,7 +1998,7 @@
           <a:p>
             <a:fld id="{CC04084B-2F15-419C-AA91-DBD329B3D928}" type="datetimeFigureOut">
               <a:rPr lang="en-US" smtClean="0"/>
-              <a:t>7/22/2015</a:t>
+              <a:t>7/23/2015</a:t>
             </a:fld>
             <a:endParaRPr lang="en-US"/>
           </a:p>
@@ -2275,7 +2275,7 @@
           <a:p>
             <a:fld id="{CC04084B-2F15-419C-AA91-DBD329B3D928}" type="datetimeFigureOut">
               <a:rPr lang="en-US" smtClean="0"/>
-              <a:t>7/22/2015</a:t>
+              <a:t>7/23/2015</a:t>
             </a:fld>
             <a:endParaRPr lang="en-US"/>
           </a:p>
@@ -2528,7 +2528,7 @@
           <a:p>
             <a:fld id="{CC04084B-2F15-419C-AA91-DBD329B3D928}" type="datetimeFigureOut">
               <a:rPr lang="en-US" smtClean="0"/>
-              <a:t>7/22/2015</a:t>
+              <a:t>7/23/2015</a:t>
             </a:fld>
             <a:endParaRPr lang="en-US"/>
           </a:p>
@@ -2741,7 +2741,7 @@
           <a:p>
             <a:fld id="{CC04084B-2F15-419C-AA91-DBD329B3D928}" type="datetimeFigureOut">
               <a:rPr lang="en-US" smtClean="0"/>
-              <a:t>7/22/2015</a:t>
+              <a:t>7/23/2015</a:t>
             </a:fld>
             <a:endParaRPr lang="en-US"/>
           </a:p>
@@ -3143,22 +3143,14 @@
             </a:r>
             <a:r>
               <a:rPr lang="en-US" sz="2800" dirty="0"/>
-              <a:t>from </a:t>
-            </a:r>
-            <a:r>
-              <a:rPr lang="en-US" sz="2800" dirty="0"/>
-              <a:t>http://rs.tdwg.org/dwc/terms/guides/rdf/index.htm</a:t>
+              <a:t>from http://rs.tdwg.org/dwc/terms/guides/rdf/index.htm</a:t>
             </a:r>
             <a:endParaRPr lang="en-US" sz="2800" dirty="0" smtClean="0"/>
           </a:p>
           <a:p>
             <a:r>
               <a:rPr lang="en-US" sz="2800" dirty="0" smtClean="0"/>
-              <a:t>Darwin-SW </a:t>
-            </a:r>
-            <a:r>
-              <a:rPr lang="en-US" sz="2800" dirty="0" smtClean="0"/>
-              <a:t>version 0.4 from </a:t>
+              <a:t>Darwin-SW version 0.4 from </a:t>
             </a:r>
             <a:r>
               <a:rPr lang="en-US" sz="2800" dirty="0"/>
@@ -3922,8 +3914,8 @@
         </p:nvSpPr>
         <p:spPr>
           <a:xfrm rot="18014929">
-            <a:off x="20841280" y="16181155"/>
-            <a:ext cx="3868175" cy="1200329"/>
+            <a:off x="20789183" y="16181155"/>
+            <a:ext cx="3972370" cy="1200329"/>
           </a:xfrm>
           <a:prstGeom prst="rect">
             <a:avLst/>
@@ -3937,21 +3929,21 @@
           <a:lstStyle/>
           <a:p>
             <a:r>
+              <a:rPr lang="en-US" sz="3600" b="1" i="1" dirty="0">
+                <a:solidFill>
+                  <a:srgbClr val="00B0F0"/>
+                </a:solidFill>
+                <a:sym typeface="Wingdings" panose="05000000000000000000" pitchFamily="2" charset="2"/>
+              </a:rPr>
+              <a:t> </a:t>
+            </a:r>
+            <a:r>
               <a:rPr lang="en-US" sz="3600" b="1" i="1" dirty="0" smtClean="0">
                 <a:solidFill>
                   <a:srgbClr val="00B0F0"/>
                 </a:solidFill>
               </a:rPr>
               <a:t>dsw:evidenceFor</a:t>
-            </a:r>
-            <a:r>
-              <a:rPr lang="en-US" sz="3600" b="1" i="1" dirty="0" smtClean="0">
-                <a:solidFill>
-                  <a:srgbClr val="00B0F0"/>
-                </a:solidFill>
-                <a:sym typeface="Wingdings" panose="05000000000000000000" pitchFamily="2" charset="2"/>
-              </a:rPr>
-              <a:t></a:t>
             </a:r>
             <a:endParaRPr lang="en-US" sz="3600" b="1" i="1" dirty="0" smtClean="0">
               <a:solidFill>
@@ -3965,17 +3957,26 @@
                 <a:solidFill>
                   <a:srgbClr val="00B0F0"/>
                 </a:solidFill>
+              </a:rPr>
+              <a:t>dsw:hasEvidence</a:t>
+            </a:r>
+            <a:r>
+              <a:rPr lang="en-US" sz="3600" b="1" i="1" dirty="0" smtClean="0">
+                <a:solidFill>
+                  <a:srgbClr val="00B0F0"/>
+                </a:solidFill>
                 <a:sym typeface="Wingdings" panose="05000000000000000000" pitchFamily="2" charset="2"/>
               </a:rPr>
-              <a:t></a:t>
-            </a:r>
-            <a:r>
-              <a:rPr lang="en-US" sz="3600" b="1" i="1" dirty="0" smtClean="0">
+              <a:t> </a:t>
+            </a:r>
+            <a:r>
+              <a:rPr lang="en-US" sz="3600" b="1" i="1" dirty="0">
                 <a:solidFill>
                   <a:srgbClr val="00B0F0"/>
                 </a:solidFill>
-              </a:rPr>
-              <a:t>dsw:hasEvidence</a:t>
+                <a:sym typeface="Wingdings" panose="05000000000000000000" pitchFamily="2" charset="2"/>
+              </a:rPr>
+              <a:t></a:t>
             </a:r>
             <a:endParaRPr lang="en-US" sz="3600" b="1" i="1" dirty="0">
               <a:solidFill>
@@ -5157,19 +5158,8 @@
                 <a:latin typeface="Courier New" panose="02070309020205020404" pitchFamily="49" charset="0"/>
                 <a:cs typeface="Courier New" panose="02070309020205020404" pitchFamily="49" charset="0"/>
               </a:rPr>
-              <a:t>blue</a:t>
-            </a:r>
-            <a:r>
-              <a:rPr lang="en-US" sz="3200" dirty="0" smtClean="0">
-                <a:latin typeface="Courier New" panose="02070309020205020404" pitchFamily="49" charset="0"/>
-                <a:cs typeface="Courier New" panose="02070309020205020404" pitchFamily="49" charset="0"/>
-              </a:rPr>
-              <a:t>=Darwin-SW</a:t>
-            </a:r>
-            <a:endParaRPr lang="en-US" sz="3200" dirty="0" smtClean="0">
-              <a:latin typeface="Courier New" panose="02070309020205020404" pitchFamily="49" charset="0"/>
-              <a:cs typeface="Courier New" panose="02070309020205020404" pitchFamily="49" charset="0"/>
-            </a:endParaRPr>
+              <a:t>blue=Darwin-SW</a:t>
+            </a:r>
           </a:p>
           <a:p>
             <a:endParaRPr lang="en-US" sz="3200" dirty="0">
@@ -5183,28 +5173,7 @@
                 <a:latin typeface="Courier New" panose="02070309020205020404" pitchFamily="49" charset="0"/>
                 <a:cs typeface="Courier New" panose="02070309020205020404" pitchFamily="49" charset="0"/>
               </a:rPr>
-              <a:t>                 </a:t>
-            </a:r>
-            <a:r>
-              <a:rPr lang="en-US" sz="3200" dirty="0" smtClean="0">
-                <a:latin typeface="Courier New" panose="02070309020205020404" pitchFamily="49" charset="0"/>
-                <a:cs typeface="Courier New" panose="02070309020205020404" pitchFamily="49" charset="0"/>
-              </a:rPr>
-              <a:t>yellow</a:t>
-            </a:r>
-            <a:r>
-              <a:rPr lang="en-US" sz="3200" dirty="0" smtClean="0">
-                <a:latin typeface="Courier New" panose="02070309020205020404" pitchFamily="49" charset="0"/>
-                <a:cs typeface="Courier New" panose="02070309020205020404" pitchFamily="49" charset="0"/>
-              </a:rPr>
-              <a:t>=FOAF </a:t>
-            </a:r>
-            <a:r>
-              <a:rPr lang="en-US" sz="3200" dirty="0" smtClean="0">
-                <a:latin typeface="Courier New" panose="02070309020205020404" pitchFamily="49" charset="0"/>
-                <a:cs typeface="Courier New" panose="02070309020205020404" pitchFamily="49" charset="0"/>
-              </a:rPr>
-              <a:t>vocabulary</a:t>
+              <a:t>                 yellow=FOAF vocabulary</a:t>
             </a:r>
           </a:p>
         </p:txBody>
@@ -5900,10 +5869,6 @@
               </a:rPr>
               <a:t>/</a:t>
             </a:r>
-            <a:endParaRPr lang="en-US" sz="3200" dirty="0" smtClean="0">
-              <a:latin typeface="Courier New" panose="02070309020205020404" pitchFamily="49" charset="0"/>
-              <a:cs typeface="Courier New" panose="02070309020205020404" pitchFamily="49" charset="0"/>
-            </a:endParaRPr>
           </a:p>
         </p:txBody>
       </p:sp>
@@ -5932,21 +5897,8 @@
             <a:pPr algn="ctr"/>
             <a:r>
               <a:rPr lang="en-US" sz="4400" b="1" dirty="0" smtClean="0"/>
-              <a:t>G</a:t>
-            </a:r>
-            <a:r>
-              <a:rPr lang="en-US" sz="4400" b="1" dirty="0" smtClean="0"/>
-              <a:t>raph </a:t>
-            </a:r>
-            <a:r>
-              <a:rPr lang="en-US" sz="4400" b="1" dirty="0" smtClean="0"/>
-              <a:t>model </a:t>
-            </a:r>
-            <a:r>
-              <a:rPr lang="en-US" sz="4400" b="1" dirty="0" smtClean="0"/>
-              <a:t>basis of</a:t>
-            </a:r>
-            <a:endParaRPr lang="en-US" sz="4400" b="1" dirty="0" smtClean="0"/>
+              <a:t>Graph model basis of</a:t>
+            </a:r>
           </a:p>
           <a:p>
             <a:pPr algn="ctr"/>
@@ -6169,13 +6121,8 @@
           <a:p>
             <a:r>
               <a:rPr lang="en-US" sz="3200" i="1" dirty="0" smtClean="0"/>
-              <a:t>can be an instance of any class</a:t>
-            </a:r>
-            <a:r>
-              <a:rPr lang="en-US" sz="3200" i="1" dirty="0" smtClean="0"/>
-              <a:t>.</a:t>
-            </a:r>
-            <a:endParaRPr lang="en-US" sz="3200" i="1" dirty="0" smtClean="0"/>
+              <a:t>can be an instance of any class.</a:t>
+            </a:r>
           </a:p>
         </p:txBody>
       </p:sp>

</xml_diff>